<commit_message>
Write the QA documentation of the project. Close #16
</commit_message>
<xml_diff>
--- a/Documentation/Presentation.pptx
+++ b/Documentation/Presentation.pptx
@@ -262,6 +262,11 @@
       </a:defRPr>
     </a:lvl9pPr>
   </p:defaultTextStyle>
+  <p:extLst>
+    <p:ext uri="{EFAFB233-063F-42B5-8137-9DF3F51BA10A}">
+      <p15:sldGuideLst xmlns:p15="http://schemas.microsoft.com/office/powerpoint/2012/main"/>
+    </p:ext>
+  </p:extLst>
 </p:presentation>
 </file>
 
@@ -44552,11 +44557,11 @@
   <p:clrMapOvr>
     <a:masterClrMapping/>
   </p:clrMapOvr>
-  <mc:AlternateContent xmlns:mc="http://schemas.openxmlformats.org/markup-compatibility/2006">
-    <mc:Choice xmlns:p14="http://schemas.microsoft.com/office/powerpoint/2010/main" Requires="p14">
+  <mc:AlternateContent xmlns:mc="http://schemas.openxmlformats.org/markup-compatibility/2006" xmlns:p14="http://schemas.microsoft.com/office/powerpoint/2010/main">
+    <mc:Choice Requires="p14">
       <p:transition p14:dur="0"/>
     </mc:Choice>
-    <mc:Fallback>
+    <mc:Fallback xmlns="">
       <p:transition/>
     </mc:Fallback>
   </mc:AlternateContent>
@@ -46056,6 +46061,16 @@
           <a:prstGeom prst="rect">
             <a:avLst/>
           </a:prstGeom>
+          <a:ln>
+            <a:noFill/>
+          </a:ln>
+          <a:effectLst>
+            <a:outerShdw blurRad="292100" dist="139700" dir="2700000" algn="tl" rotWithShape="0">
+              <a:srgbClr val="333333">
+                <a:alpha val="65000"/>
+              </a:srgbClr>
+            </a:outerShdw>
+          </a:effectLst>
         </p:spPr>
       </p:pic>
       <p:sp>
@@ -46171,6 +46186,16 @@
           <a:prstGeom prst="rect">
             <a:avLst/>
           </a:prstGeom>
+          <a:ln>
+            <a:noFill/>
+          </a:ln>
+          <a:effectLst>
+            <a:outerShdw blurRad="292100" dist="139700" dir="2700000" algn="tl" rotWithShape="0">
+              <a:srgbClr val="333333">
+                <a:alpha val="65000"/>
+              </a:srgbClr>
+            </a:outerShdw>
+          </a:effectLst>
         </p:spPr>
       </p:pic>
       <p:pic>
@@ -46201,6 +46226,16 @@
           <a:prstGeom prst="rect">
             <a:avLst/>
           </a:prstGeom>
+          <a:ln>
+            <a:noFill/>
+          </a:ln>
+          <a:effectLst>
+            <a:outerShdw blurRad="292100" dist="139700" dir="2700000" algn="tl" rotWithShape="0">
+              <a:srgbClr val="333333">
+                <a:alpha val="65000"/>
+              </a:srgbClr>
+            </a:outerShdw>
+          </a:effectLst>
         </p:spPr>
       </p:pic>
       <p:sp>

</xml_diff>